<commit_message>
Added an example component
</commit_message>
<xml_diff>
--- a/Composite Components.pptx
+++ b/Composite Components.pptx
@@ -10,7 +10,10 @@
     <p:sldId id="260" r:id="rId4"/>
     <p:sldId id="261" r:id="rId5"/>
     <p:sldId id="262" r:id="rId6"/>
-    <p:sldId id="263" r:id="rId7"/>
+    <p:sldId id="264" r:id="rId7"/>
+    <p:sldId id="265" r:id="rId8"/>
+    <p:sldId id="266" r:id="rId9"/>
+    <p:sldId id="263" r:id="rId10"/>
   </p:sldIdLst>
   <p:sldSz cx="9144000" cy="5143500" type="screen16x9"/>
   <p:notesSz cx="6858000" cy="9144000"/>
@@ -478,7 +481,7 @@
           <a:p>
             <a:fld id="{A9710CDB-38B1-8E43-A846-6FE3B07A872E}" type="datetime1">
               <a:rPr lang="en-US" noProof="0" smtClean="0"/>
-              <a:t>4/11/2018</a:t>
+              <a:t>4/14/2018</a:t>
             </a:fld>
             <a:endParaRPr lang="nl-NL" noProof="0" dirty="0"/>
           </a:p>
@@ -873,7 +876,7 @@
           <a:p>
             <a:fld id="{12D8B67E-1464-254D-876A-5A059C6CA686}" type="datetime1">
               <a:rPr lang="en-US" smtClean="0"/>
-              <a:t>4/11/2018</a:t>
+              <a:t>4/14/2018</a:t>
             </a:fld>
             <a:endParaRPr lang="nl-NL"/>
           </a:p>
@@ -1292,7 +1295,7 @@
           <a:p>
             <a:fld id="{1297756A-AF1A-B249-A7CF-A1AE4E86FA38}" type="datetime1">
               <a:rPr lang="en-US" smtClean="0"/>
-              <a:t>4/11/2018</a:t>
+              <a:t>4/14/2018</a:t>
             </a:fld>
             <a:endParaRPr lang="nl-NL"/>
           </a:p>
@@ -1653,7 +1656,7 @@
           <a:p>
             <a:fld id="{37C8E900-D3BD-ED44-9070-3471A5611DC2}" type="datetime1">
               <a:rPr lang="en-US" smtClean="0"/>
-              <a:t>4/11/2018</a:t>
+              <a:t>4/14/2018</a:t>
             </a:fld>
             <a:endParaRPr lang="nl-NL"/>
           </a:p>
@@ -1831,7 +1834,7 @@
           <a:p>
             <a:fld id="{203D5A3F-EB4E-3340-8D19-07B028CB11AD}" type="datetime1">
               <a:rPr lang="en-US" smtClean="0"/>
-              <a:t>4/11/2018</a:t>
+              <a:t>4/14/2018</a:t>
             </a:fld>
             <a:endParaRPr lang="nl-NL"/>
           </a:p>
@@ -2760,7 +2763,7 @@
           <a:p>
             <a:fld id="{405216DA-0E4B-CC41-ACBF-76C3BC02E189}" type="datetime1">
               <a:rPr lang="en-US" smtClean="0"/>
-              <a:t>4/11/2018</a:t>
+              <a:t>4/14/2018</a:t>
             </a:fld>
             <a:endParaRPr lang="nl-NL"/>
           </a:p>
@@ -3009,7 +3012,7 @@
             <a:fld id="{6B386563-B90A-4125-A564-304866187BB1}" type="datetime1">
               <a:rPr lang="nl-NL" smtClean="0"/>
               <a:pPr/>
-              <a:t>11-4-2018</a:t>
+              <a:t>14-4-2018</a:t>
             </a:fld>
             <a:endParaRPr lang="nl-NL" dirty="0"/>
           </a:p>
@@ -3274,7 +3277,7 @@
           <a:p>
             <a:fld id="{A4AB6030-B80C-7C4C-B97F-1ADFAB53E146}" type="datetime1">
               <a:rPr lang="en-US" smtClean="0"/>
-              <a:t>4/11/2018</a:t>
+              <a:t>4/14/2018</a:t>
             </a:fld>
             <a:endParaRPr lang="nl-NL"/>
           </a:p>
@@ -3441,7 +3444,7 @@
           <a:p>
             <a:fld id="{DA73B474-0AB7-8846-BA6A-67033A8CF4FA}" type="datetime1">
               <a:rPr lang="en-US" smtClean="0"/>
-              <a:t>4/11/2018</a:t>
+              <a:t>4/14/2018</a:t>
             </a:fld>
             <a:endParaRPr lang="nl-NL"/>
           </a:p>
@@ -3903,7 +3906,7 @@
           <a:p>
             <a:fld id="{56BA50C8-7311-E14C-816D-7251E320C8DC}" type="datetime1">
               <a:rPr lang="en-US" smtClean="0"/>
-              <a:t>4/11/2018</a:t>
+              <a:t>4/14/2018</a:t>
             </a:fld>
             <a:endParaRPr lang="nl-NL"/>
           </a:p>
@@ -4516,7 +4519,7 @@
           <a:p>
             <a:fld id="{A9710CDB-38B1-8E43-A846-6FE3B07A872E}" type="datetime1">
               <a:rPr lang="en-US" noProof="0" smtClean="0"/>
-              <a:t>4/11/2018</a:t>
+              <a:t>4/14/2018</a:t>
             </a:fld>
             <a:endParaRPr lang="nl-NL" noProof="0" dirty="0"/>
           </a:p>
@@ -4830,7 +4833,7 @@
           <a:p>
             <a:fld id="{E300D605-E2BB-8B4E-A2F3-5A64231C34A6}" type="datetime1">
               <a:rPr lang="en-US" smtClean="0"/>
-              <a:t>4/11/2018</a:t>
+              <a:t>4/14/2018</a:t>
             </a:fld>
             <a:endParaRPr lang="nl-NL"/>
           </a:p>
@@ -5326,11 +5329,7 @@
             <a:pPr lvl="1"/>
             <a:r>
               <a:rPr lang="nl-NL" smtClean="0"/>
-              <a:t>Encapsulated piece of </a:t>
-            </a:r>
-            <a:r>
-              <a:rPr lang="nl-NL" smtClean="0"/>
-              <a:t>functionality</a:t>
+              <a:t>Encapsulated piece of functionality</a:t>
             </a:r>
           </a:p>
           <a:p>
@@ -5344,7 +5343,6 @@
               <a:rPr lang="nl-NL" smtClean="0"/>
               <a:t>Why use it?</a:t>
             </a:r>
-            <a:endParaRPr lang="nl-NL" smtClean="0"/>
           </a:p>
           <a:p>
             <a:pPr lvl="1"/>
@@ -5357,29 +5355,15 @@
             <a:pPr lvl="1"/>
             <a:r>
               <a:rPr lang="nl-NL" smtClean="0"/>
-              <a:t>Ready </a:t>
-            </a:r>
+              <a:t>Ready to distribute</a:t>
+            </a:r>
+          </a:p>
+          <a:p>
+            <a:pPr lvl="1"/>
             <a:r>
               <a:rPr lang="nl-NL" smtClean="0"/>
-              <a:t>to </a:t>
-            </a:r>
-            <a:r>
-              <a:rPr lang="nl-NL" smtClean="0"/>
-              <a:t>distribute</a:t>
-            </a:r>
-            <a:endParaRPr lang="nl-NL" smtClean="0"/>
-          </a:p>
-          <a:p>
-            <a:pPr lvl="1"/>
-            <a:r>
-              <a:rPr lang="nl-NL" smtClean="0"/>
-              <a:t>Ready for </a:t>
-            </a:r>
-            <a:r>
-              <a:rPr lang="nl-NL" smtClean="0"/>
-              <a:t>re-use</a:t>
-            </a:r>
-            <a:endParaRPr lang="nl-NL" smtClean="0"/>
+              <a:t>Ready for re-use</a:t>
+            </a:r>
           </a:p>
           <a:p>
             <a:pPr lvl="1"/>
@@ -5674,11 +5658,7 @@
           <a:p>
             <a:r>
               <a:rPr lang="nl-NL"/>
-              <a:t>ojet create </a:t>
-            </a:r>
-            <a:r>
-              <a:rPr lang="nl-NL"/>
-              <a:t>component </a:t>
+              <a:t>ojet create component </a:t>
             </a:r>
             <a:r>
               <a:rPr lang="nl-NL" smtClean="0"/>
@@ -6106,7 +6086,7 @@
           <a:p>
             <a:r>
               <a:rPr lang="nl-NL" smtClean="0"/>
-              <a:t>Excercise notes</a:t>
+              <a:t>Example</a:t>
             </a:r>
             <a:endParaRPr lang="nl-NL"/>
           </a:p>
@@ -6127,16 +6107,9 @@
           <a:bodyPr/>
           <a:lstStyle/>
           <a:p>
-            <a:r>
-              <a:rPr lang="nl-NL" smtClean="0"/>
-              <a:t>Simple component for use in VBCS training</a:t>
-            </a:r>
-          </a:p>
-          <a:p>
-            <a:r>
-              <a:rPr lang="nl-NL" smtClean="0"/>
-              <a:t>Expand on this after</a:t>
-            </a:r>
+            <a:pPr marL="0" indent="0">
+              <a:buNone/>
+            </a:pPr>
             <a:endParaRPr lang="nl-NL"/>
           </a:p>
           <a:p>
@@ -6185,6 +6158,557 @@
             <a:fld id="{14F1411D-0280-154F-AEAC-4C20B7AA46B2}" type="slidenum">
               <a:rPr lang="nl-NL" smtClean="0"/>
               <a:t>6</a:t>
+            </a:fld>
+            <a:endParaRPr lang="nl-NL"/>
+          </a:p>
+        </p:txBody>
+      </p:sp>
+      <p:pic>
+        <p:nvPicPr>
+          <p:cNvPr id="6" name="Picture 5"/>
+          <p:cNvPicPr>
+            <a:picLocks noChangeAspect="1"/>
+          </p:cNvPicPr>
+          <p:nvPr/>
+        </p:nvPicPr>
+        <p:blipFill>
+          <a:blip r:embed="rId2"/>
+          <a:stretch>
+            <a:fillRect/>
+          </a:stretch>
+        </p:blipFill>
+        <p:spPr>
+          <a:xfrm>
+            <a:off x="2144350" y="348395"/>
+            <a:ext cx="5357324" cy="4183743"/>
+          </a:xfrm>
+          <a:prstGeom prst="rect">
+            <a:avLst/>
+          </a:prstGeom>
+        </p:spPr>
+      </p:pic>
+    </p:spTree>
+    <p:extLst>
+      <p:ext uri="{BB962C8B-B14F-4D97-AF65-F5344CB8AC3E}">
+        <p14:creationId xmlns:p14="http://schemas.microsoft.com/office/powerpoint/2010/main" val="3129961183"/>
+      </p:ext>
+    </p:extLst>
+  </p:cSld>
+  <p:clrMapOvr>
+    <a:masterClrMapping/>
+  </p:clrMapOvr>
+</p:sld>
+</file>
+
+<file path=ppt/slides/slide7.xml><?xml version="1.0" encoding="utf-8"?>
+<p:sld xmlns:a="http://schemas.openxmlformats.org/drawingml/2006/main" xmlns:r="http://schemas.openxmlformats.org/officeDocument/2006/relationships" xmlns:p="http://schemas.openxmlformats.org/presentationml/2006/main">
+  <p:cSld>
+    <p:spTree>
+      <p:nvGrpSpPr>
+        <p:cNvPr id="1" name=""/>
+        <p:cNvGrpSpPr/>
+        <p:nvPr/>
+      </p:nvGrpSpPr>
+      <p:grpSpPr>
+        <a:xfrm>
+          <a:off x="0" y="0"/>
+          <a:ext cx="0" cy="0"/>
+          <a:chOff x="0" y="0"/>
+          <a:chExt cx="0" cy="0"/>
+        </a:xfrm>
+      </p:grpSpPr>
+      <p:sp>
+        <p:nvSpPr>
+          <p:cNvPr id="2" name="Title 1"/>
+          <p:cNvSpPr>
+            <a:spLocks noGrp="1"/>
+          </p:cNvSpPr>
+          <p:nvPr>
+            <p:ph type="title"/>
+          </p:nvPr>
+        </p:nvSpPr>
+        <p:spPr/>
+        <p:txBody>
+          <a:bodyPr/>
+          <a:lstStyle/>
+          <a:p>
+            <a:r>
+              <a:rPr lang="nl-NL" smtClean="0"/>
+              <a:t>Example</a:t>
+            </a:r>
+            <a:endParaRPr lang="nl-NL"/>
+          </a:p>
+        </p:txBody>
+      </p:sp>
+      <p:sp>
+        <p:nvSpPr>
+          <p:cNvPr id="3" name="Content Placeholder 2"/>
+          <p:cNvSpPr>
+            <a:spLocks noGrp="1"/>
+          </p:cNvSpPr>
+          <p:nvPr>
+            <p:ph idx="1"/>
+          </p:nvPr>
+        </p:nvSpPr>
+        <p:spPr/>
+        <p:txBody>
+          <a:bodyPr/>
+          <a:lstStyle/>
+          <a:p>
+            <a:pPr marL="0" indent="0">
+              <a:buNone/>
+            </a:pPr>
+            <a:endParaRPr lang="nl-NL"/>
+          </a:p>
+          <a:p>
+            <a:endParaRPr lang="nl-NL"/>
+          </a:p>
+        </p:txBody>
+      </p:sp>
+      <p:sp>
+        <p:nvSpPr>
+          <p:cNvPr id="4" name="Footer Placeholder 3"/>
+          <p:cNvSpPr>
+            <a:spLocks noGrp="1"/>
+          </p:cNvSpPr>
+          <p:nvPr>
+            <p:ph type="ftr" sz="quarter" idx="11"/>
+          </p:nvPr>
+        </p:nvSpPr>
+        <p:spPr/>
+        <p:txBody>
+          <a:bodyPr/>
+          <a:lstStyle/>
+          <a:p>
+            <a:r>
+              <a:rPr lang="nl-NL" smtClean="0"/>
+              <a:t>Demonstration, sprint 3</a:t>
+            </a:r>
+            <a:endParaRPr lang="nl-NL" dirty="0"/>
+          </a:p>
+        </p:txBody>
+      </p:sp>
+      <p:sp>
+        <p:nvSpPr>
+          <p:cNvPr id="5" name="Slide Number Placeholder 4"/>
+          <p:cNvSpPr>
+            <a:spLocks noGrp="1"/>
+          </p:cNvSpPr>
+          <p:nvPr>
+            <p:ph type="sldNum" sz="quarter" idx="12"/>
+          </p:nvPr>
+        </p:nvSpPr>
+        <p:spPr/>
+        <p:txBody>
+          <a:bodyPr/>
+          <a:lstStyle/>
+          <a:p>
+            <a:fld id="{14F1411D-0280-154F-AEAC-4C20B7AA46B2}" type="slidenum">
+              <a:rPr lang="nl-NL" smtClean="0"/>
+              <a:t>7</a:t>
+            </a:fld>
+            <a:endParaRPr lang="nl-NL"/>
+          </a:p>
+        </p:txBody>
+      </p:sp>
+      <p:pic>
+        <p:nvPicPr>
+          <p:cNvPr id="7" name="Picture 6"/>
+          <p:cNvPicPr>
+            <a:picLocks noChangeAspect="1"/>
+          </p:cNvPicPr>
+          <p:nvPr/>
+        </p:nvPicPr>
+        <p:blipFill>
+          <a:blip r:embed="rId2"/>
+          <a:stretch>
+            <a:fillRect/>
+          </a:stretch>
+        </p:blipFill>
+        <p:spPr>
+          <a:xfrm>
+            <a:off x="1485632" y="1123824"/>
+            <a:ext cx="6172735" cy="2895851"/>
+          </a:xfrm>
+          <a:prstGeom prst="rect">
+            <a:avLst/>
+          </a:prstGeom>
+        </p:spPr>
+      </p:pic>
+    </p:spTree>
+    <p:extLst>
+      <p:ext uri="{BB962C8B-B14F-4D97-AF65-F5344CB8AC3E}">
+        <p14:creationId xmlns:p14="http://schemas.microsoft.com/office/powerpoint/2010/main" val="1519414229"/>
+      </p:ext>
+    </p:extLst>
+  </p:cSld>
+  <p:clrMapOvr>
+    <a:masterClrMapping/>
+  </p:clrMapOvr>
+</p:sld>
+</file>
+
+<file path=ppt/slides/slide8.xml><?xml version="1.0" encoding="utf-8"?>
+<p:sld xmlns:a="http://schemas.openxmlformats.org/drawingml/2006/main" xmlns:r="http://schemas.openxmlformats.org/officeDocument/2006/relationships" xmlns:p="http://schemas.openxmlformats.org/presentationml/2006/main">
+  <p:cSld>
+    <p:spTree>
+      <p:nvGrpSpPr>
+        <p:cNvPr id="1" name=""/>
+        <p:cNvGrpSpPr/>
+        <p:nvPr/>
+      </p:nvGrpSpPr>
+      <p:grpSpPr>
+        <a:xfrm>
+          <a:off x="0" y="0"/>
+          <a:ext cx="0" cy="0"/>
+          <a:chOff x="0" y="0"/>
+          <a:chExt cx="0" cy="0"/>
+        </a:xfrm>
+      </p:grpSpPr>
+      <p:sp>
+        <p:nvSpPr>
+          <p:cNvPr id="2" name="Title 1"/>
+          <p:cNvSpPr>
+            <a:spLocks noGrp="1"/>
+          </p:cNvSpPr>
+          <p:nvPr>
+            <p:ph type="title"/>
+          </p:nvPr>
+        </p:nvSpPr>
+        <p:spPr/>
+        <p:txBody>
+          <a:bodyPr/>
+          <a:lstStyle/>
+          <a:p>
+            <a:r>
+              <a:rPr lang="nl-NL" smtClean="0"/>
+              <a:t>Example</a:t>
+            </a:r>
+            <a:endParaRPr lang="nl-NL"/>
+          </a:p>
+        </p:txBody>
+      </p:sp>
+      <p:sp>
+        <p:nvSpPr>
+          <p:cNvPr id="3" name="Content Placeholder 2"/>
+          <p:cNvSpPr>
+            <a:spLocks noGrp="1"/>
+          </p:cNvSpPr>
+          <p:nvPr>
+            <p:ph idx="1"/>
+          </p:nvPr>
+        </p:nvSpPr>
+        <p:spPr/>
+        <p:txBody>
+          <a:bodyPr/>
+          <a:lstStyle/>
+          <a:p>
+            <a:endParaRPr lang="en-US" smtClean="0"/>
+          </a:p>
+          <a:p>
+            <a:endParaRPr lang="en-US"/>
+          </a:p>
+          <a:p>
+            <a:endParaRPr lang="en-US" smtClean="0"/>
+          </a:p>
+          <a:p>
+            <a:endParaRPr lang="en-US"/>
+          </a:p>
+          <a:p>
+            <a:endParaRPr lang="en-US" smtClean="0"/>
+          </a:p>
+          <a:p>
+            <a:endParaRPr lang="en-US"/>
+          </a:p>
+          <a:p>
+            <a:endParaRPr lang="en-US" smtClean="0"/>
+          </a:p>
+          <a:p>
+            <a:endParaRPr lang="en-US"/>
+          </a:p>
+          <a:p>
+            <a:endParaRPr lang="en-US" smtClean="0"/>
+          </a:p>
+          <a:p>
+            <a:endParaRPr lang="en-US"/>
+          </a:p>
+          <a:p>
+            <a:endParaRPr lang="en-US" smtClean="0"/>
+          </a:p>
+          <a:p>
+            <a:r>
+              <a:rPr lang="en-US" smtClean="0"/>
+              <a:t>Camel-case </a:t>
+            </a:r>
+            <a:r>
+              <a:rPr lang="en-US"/>
+              <a:t>property names are converted into case-insensitive HTML element attributes with hyphens at the camel-case break point of the original name</a:t>
+            </a:r>
+            <a:r>
+              <a:rPr lang="en-US"/>
+              <a:t>. </a:t>
+            </a:r>
+            <a:endParaRPr lang="nl-NL"/>
+          </a:p>
+          <a:p>
+            <a:endParaRPr lang="nl-NL"/>
+          </a:p>
+        </p:txBody>
+      </p:sp>
+      <p:sp>
+        <p:nvSpPr>
+          <p:cNvPr id="4" name="Footer Placeholder 3"/>
+          <p:cNvSpPr>
+            <a:spLocks noGrp="1"/>
+          </p:cNvSpPr>
+          <p:nvPr>
+            <p:ph type="ftr" sz="quarter" idx="11"/>
+          </p:nvPr>
+        </p:nvSpPr>
+        <p:spPr/>
+        <p:txBody>
+          <a:bodyPr/>
+          <a:lstStyle/>
+          <a:p>
+            <a:r>
+              <a:rPr lang="nl-NL" smtClean="0"/>
+              <a:t>Demonstration, sprint 3</a:t>
+            </a:r>
+            <a:endParaRPr lang="nl-NL" dirty="0"/>
+          </a:p>
+        </p:txBody>
+      </p:sp>
+      <p:sp>
+        <p:nvSpPr>
+          <p:cNvPr id="5" name="Slide Number Placeholder 4"/>
+          <p:cNvSpPr>
+            <a:spLocks noGrp="1"/>
+          </p:cNvSpPr>
+          <p:nvPr>
+            <p:ph type="sldNum" sz="quarter" idx="12"/>
+          </p:nvPr>
+        </p:nvSpPr>
+        <p:spPr/>
+        <p:txBody>
+          <a:bodyPr/>
+          <a:lstStyle/>
+          <a:p>
+            <a:fld id="{14F1411D-0280-154F-AEAC-4C20B7AA46B2}" type="slidenum">
+              <a:rPr lang="nl-NL" smtClean="0"/>
+              <a:t>8</a:t>
+            </a:fld>
+            <a:endParaRPr lang="nl-NL"/>
+          </a:p>
+        </p:txBody>
+      </p:sp>
+      <p:pic>
+        <p:nvPicPr>
+          <p:cNvPr id="6" name="Picture 5"/>
+          <p:cNvPicPr>
+            <a:picLocks noChangeAspect="1"/>
+          </p:cNvPicPr>
+          <p:nvPr/>
+        </p:nvPicPr>
+        <p:blipFill>
+          <a:blip r:embed="rId2"/>
+          <a:stretch>
+            <a:fillRect/>
+          </a:stretch>
+        </p:blipFill>
+        <p:spPr>
+          <a:xfrm>
+            <a:off x="483544" y="732800"/>
+            <a:ext cx="4100410" cy="1932130"/>
+          </a:xfrm>
+          <a:prstGeom prst="rect">
+            <a:avLst/>
+          </a:prstGeom>
+        </p:spPr>
+      </p:pic>
+      <p:pic>
+        <p:nvPicPr>
+          <p:cNvPr id="8" name="Picture 7"/>
+          <p:cNvPicPr>
+            <a:picLocks noChangeAspect="1"/>
+          </p:cNvPicPr>
+          <p:nvPr/>
+        </p:nvPicPr>
+        <p:blipFill>
+          <a:blip r:embed="rId3"/>
+          <a:stretch>
+            <a:fillRect/>
+          </a:stretch>
+        </p:blipFill>
+        <p:spPr>
+          <a:xfrm>
+            <a:off x="4968000" y="2009553"/>
+            <a:ext cx="3002540" cy="1310754"/>
+          </a:xfrm>
+          <a:prstGeom prst="rect">
+            <a:avLst/>
+          </a:prstGeom>
+          <a:solidFill>
+            <a:srgbClr val="FFFFFF">
+              <a:shade val="85000"/>
+            </a:srgbClr>
+          </a:solidFill>
+          <a:ln w="88900" cap="sq">
+            <a:solidFill>
+              <a:srgbClr val="FFFFFF"/>
+            </a:solidFill>
+            <a:miter lim="800000"/>
+          </a:ln>
+          <a:effectLst>
+            <a:outerShdw blurRad="55000" dist="18000" dir="5400000" algn="tl" rotWithShape="0">
+              <a:srgbClr val="000000">
+                <a:alpha val="40000"/>
+              </a:srgbClr>
+            </a:outerShdw>
+          </a:effectLst>
+          <a:scene3d>
+            <a:camera prst="orthographicFront"/>
+            <a:lightRig rig="twoPt" dir="t">
+              <a:rot lat="0" lon="0" rev="7200000"/>
+            </a:lightRig>
+          </a:scene3d>
+          <a:sp3d>
+            <a:bevelT w="25400" h="19050"/>
+            <a:contourClr>
+              <a:srgbClr val="FFFFFF"/>
+            </a:contourClr>
+          </a:sp3d>
+        </p:spPr>
+      </p:pic>
+    </p:spTree>
+    <p:extLst>
+      <p:ext uri="{BB962C8B-B14F-4D97-AF65-F5344CB8AC3E}">
+        <p14:creationId xmlns:p14="http://schemas.microsoft.com/office/powerpoint/2010/main" val="1737113812"/>
+      </p:ext>
+    </p:extLst>
+  </p:cSld>
+  <p:clrMapOvr>
+    <a:masterClrMapping/>
+  </p:clrMapOvr>
+</p:sld>
+</file>
+
+<file path=ppt/slides/slide9.xml><?xml version="1.0" encoding="utf-8"?>
+<p:sld xmlns:a="http://schemas.openxmlformats.org/drawingml/2006/main" xmlns:r="http://schemas.openxmlformats.org/officeDocument/2006/relationships" xmlns:p="http://schemas.openxmlformats.org/presentationml/2006/main">
+  <p:cSld>
+    <p:spTree>
+      <p:nvGrpSpPr>
+        <p:cNvPr id="1" name=""/>
+        <p:cNvGrpSpPr/>
+        <p:nvPr/>
+      </p:nvGrpSpPr>
+      <p:grpSpPr>
+        <a:xfrm>
+          <a:off x="0" y="0"/>
+          <a:ext cx="0" cy="0"/>
+          <a:chOff x="0" y="0"/>
+          <a:chExt cx="0" cy="0"/>
+        </a:xfrm>
+      </p:grpSpPr>
+      <p:sp>
+        <p:nvSpPr>
+          <p:cNvPr id="2" name="Title 1"/>
+          <p:cNvSpPr>
+            <a:spLocks noGrp="1"/>
+          </p:cNvSpPr>
+          <p:nvPr>
+            <p:ph type="title"/>
+          </p:nvPr>
+        </p:nvSpPr>
+        <p:spPr/>
+        <p:txBody>
+          <a:bodyPr/>
+          <a:lstStyle/>
+          <a:p>
+            <a:r>
+              <a:rPr lang="nl-NL" smtClean="0"/>
+              <a:t>Excercise notes</a:t>
+            </a:r>
+            <a:endParaRPr lang="nl-NL"/>
+          </a:p>
+        </p:txBody>
+      </p:sp>
+      <p:sp>
+        <p:nvSpPr>
+          <p:cNvPr id="3" name="Content Placeholder 2"/>
+          <p:cNvSpPr>
+            <a:spLocks noGrp="1"/>
+          </p:cNvSpPr>
+          <p:nvPr>
+            <p:ph idx="1"/>
+          </p:nvPr>
+        </p:nvSpPr>
+        <p:spPr/>
+        <p:txBody>
+          <a:bodyPr/>
+          <a:lstStyle/>
+          <a:p>
+            <a:r>
+              <a:rPr lang="nl-NL" smtClean="0"/>
+              <a:t>Simple component for use in VBCS training</a:t>
+            </a:r>
+          </a:p>
+          <a:p>
+            <a:r>
+              <a:rPr lang="nl-NL" smtClean="0"/>
+              <a:t>Expand on this </a:t>
+            </a:r>
+            <a:r>
+              <a:rPr lang="nl-NL" smtClean="0"/>
+              <a:t>with extra excercises</a:t>
+            </a:r>
+            <a:endParaRPr lang="nl-NL"/>
+          </a:p>
+          <a:p>
+            <a:endParaRPr lang="nl-NL"/>
+          </a:p>
+        </p:txBody>
+      </p:sp>
+      <p:sp>
+        <p:nvSpPr>
+          <p:cNvPr id="4" name="Footer Placeholder 3"/>
+          <p:cNvSpPr>
+            <a:spLocks noGrp="1"/>
+          </p:cNvSpPr>
+          <p:nvPr>
+            <p:ph type="ftr" sz="quarter" idx="11"/>
+          </p:nvPr>
+        </p:nvSpPr>
+        <p:spPr/>
+        <p:txBody>
+          <a:bodyPr/>
+          <a:lstStyle/>
+          <a:p>
+            <a:r>
+              <a:rPr lang="nl-NL" smtClean="0"/>
+              <a:t>Demonstration, sprint 3</a:t>
+            </a:r>
+            <a:endParaRPr lang="nl-NL" dirty="0"/>
+          </a:p>
+        </p:txBody>
+      </p:sp>
+      <p:sp>
+        <p:nvSpPr>
+          <p:cNvPr id="5" name="Slide Number Placeholder 4"/>
+          <p:cNvSpPr>
+            <a:spLocks noGrp="1"/>
+          </p:cNvSpPr>
+          <p:nvPr>
+            <p:ph type="sldNum" sz="quarter" idx="12"/>
+          </p:nvPr>
+        </p:nvSpPr>
+        <p:spPr/>
+        <p:txBody>
+          <a:bodyPr/>
+          <a:lstStyle/>
+          <a:p>
+            <a:fld id="{14F1411D-0280-154F-AEAC-4C20B7AA46B2}" type="slidenum">
+              <a:rPr lang="nl-NL" smtClean="0"/>
+              <a:t>9</a:t>
             </a:fld>
             <a:endParaRPr lang="nl-NL"/>
           </a:p>

</xml_diff>